<commit_message>
eigenvector pic1 오타 수정
</commit_message>
<xml_diff>
--- a/pics/eigen_vector_values/pics.pptx
+++ b/pics/eigen_vector_values/pics.pptx
@@ -4058,11 +4058,11 @@
           <a:p>
             <a:pPr algn="ctr"/>
             <a:r>
-              <a:rPr lang="en-US" altLang="ko-KR" dirty="0">
+              <a:rPr lang="en-US" altLang="ko-KR">
                 <a:latin typeface="Calibri" panose="020F0502020204030204" pitchFamily="34" charset="0"/>
                 <a:cs typeface="Calibri" panose="020F0502020204030204" pitchFamily="34" charset="0"/>
               </a:rPr>
-              <a:t>matrix</a:t>
+              <a:t>vector</a:t>
             </a:r>
             <a:endParaRPr lang="ko-KR" altLang="en-US" dirty="0">
               <a:latin typeface="Calibri" panose="020F0502020204030204" pitchFamily="34" charset="0"/>

</xml_diff>